<commit_message>
Updated Heliotis Slides to final offering of course at RIT
</commit_message>
<xml_diff>
--- a/Heliotis_Slides/C_Environment/C_Environment.pptx
+++ b/Heliotis_Slides/C_Environment/C_Environment.pptx
@@ -204,7 +204,7 @@
           <a:p>
             <a:fld id="{9601DF97-034B-874D-8303-F78DE0F6FC76}" type="datetimeFigureOut">
               <a:rPr lang="en-US" smtClean="0"/>
-              <a:t>9/9/20</a:t>
+              <a:t>2/8/21</a:t>
             </a:fld>
             <a:endParaRPr lang="en-US"/>
           </a:p>
@@ -515,6 +515,720 @@
           <a:bodyPr/>
           <a:lstStyle/>
           <a:p>
+            <a:r>
+              <a:rPr lang="en-US" sz="1200" kern="1200" dirty="0" err="1">
+                <a:solidFill>
+                  <a:schemeClr val="tx1"/>
+                </a:solidFill>
+                <a:effectLst/>
+                <a:latin typeface="+mn-lt"/>
+                <a:ea typeface="+mn-ea"/>
+                <a:cs typeface="+mn-cs"/>
+              </a:rPr>
+              <a:t>jshell</a:t>
+            </a:r>
+            <a:r>
+              <a:rPr lang="en-US" sz="1200" kern="1200" dirty="0">
+                <a:solidFill>
+                  <a:schemeClr val="tx1"/>
+                </a:solidFill>
+                <a:effectLst/>
+                <a:latin typeface="+mn-lt"/>
+                <a:ea typeface="+mn-ea"/>
+                <a:cs typeface="+mn-cs"/>
+              </a:rPr>
+              <a:t>&gt; public class Foo {}</a:t>
+            </a:r>
+          </a:p>
+          <a:p>
+            <a:r>
+              <a:rPr lang="en-US" sz="1200" kern="1200" dirty="0">
+                <a:solidFill>
+                  <a:schemeClr val="tx1"/>
+                </a:solidFill>
+                <a:effectLst/>
+                <a:latin typeface="+mn-lt"/>
+                <a:ea typeface="+mn-ea"/>
+                <a:cs typeface="+mn-cs"/>
+              </a:rPr>
+              <a:t>|  created class Foo</a:t>
+            </a:r>
+          </a:p>
+          <a:p>
+            <a:endParaRPr lang="en-US" sz="1200" kern="1200" dirty="0">
+              <a:solidFill>
+                <a:schemeClr val="tx1"/>
+              </a:solidFill>
+              <a:effectLst/>
+              <a:latin typeface="+mn-lt"/>
+              <a:ea typeface="+mn-ea"/>
+              <a:cs typeface="+mn-cs"/>
+            </a:endParaRPr>
+          </a:p>
+          <a:p>
+            <a:r>
+              <a:rPr lang="en-US" sz="1200" kern="1200" dirty="0" err="1">
+                <a:solidFill>
+                  <a:schemeClr val="tx1"/>
+                </a:solidFill>
+                <a:effectLst/>
+                <a:latin typeface="+mn-lt"/>
+                <a:ea typeface="+mn-ea"/>
+                <a:cs typeface="+mn-cs"/>
+              </a:rPr>
+              <a:t>jshell</a:t>
+            </a:r>
+            <a:r>
+              <a:rPr lang="en-US" sz="1200" kern="1200" dirty="0">
+                <a:solidFill>
+                  <a:schemeClr val="tx1"/>
+                </a:solidFill>
+                <a:effectLst/>
+                <a:latin typeface="+mn-lt"/>
+                <a:ea typeface="+mn-ea"/>
+                <a:cs typeface="+mn-cs"/>
+              </a:rPr>
+              <a:t>&gt; Foo </a:t>
+            </a:r>
+            <a:r>
+              <a:rPr lang="en-US" sz="1200" kern="1200" dirty="0" err="1">
+                <a:solidFill>
+                  <a:schemeClr val="tx1"/>
+                </a:solidFill>
+                <a:effectLst/>
+                <a:latin typeface="+mn-lt"/>
+                <a:ea typeface="+mn-ea"/>
+                <a:cs typeface="+mn-cs"/>
+              </a:rPr>
+              <a:t>instanceof</a:t>
+            </a:r>
+            <a:r>
+              <a:rPr lang="en-US" sz="1200" kern="1200" dirty="0">
+                <a:solidFill>
+                  <a:schemeClr val="tx1"/>
+                </a:solidFill>
+                <a:effectLst/>
+                <a:latin typeface="+mn-lt"/>
+                <a:ea typeface="+mn-ea"/>
+                <a:cs typeface="+mn-cs"/>
+              </a:rPr>
+              <a:t> Class</a:t>
+            </a:r>
+          </a:p>
+          <a:p>
+            <a:r>
+              <a:rPr lang="en-US" sz="1200" kern="1200" dirty="0">
+                <a:solidFill>
+                  <a:schemeClr val="tx1"/>
+                </a:solidFill>
+                <a:effectLst/>
+                <a:latin typeface="+mn-lt"/>
+                <a:ea typeface="+mn-ea"/>
+                <a:cs typeface="+mn-cs"/>
+              </a:rPr>
+              <a:t>|  Error:</a:t>
+            </a:r>
+          </a:p>
+          <a:p>
+            <a:r>
+              <a:rPr lang="en-US" sz="1200" kern="1200" dirty="0">
+                <a:solidFill>
+                  <a:schemeClr val="tx1"/>
+                </a:solidFill>
+                <a:effectLst/>
+                <a:latin typeface="+mn-lt"/>
+                <a:ea typeface="+mn-ea"/>
+                <a:cs typeface="+mn-cs"/>
+              </a:rPr>
+              <a:t>|  cannot find symbol</a:t>
+            </a:r>
+          </a:p>
+          <a:p>
+            <a:r>
+              <a:rPr lang="en-US" sz="1200" kern="1200" dirty="0">
+                <a:solidFill>
+                  <a:schemeClr val="tx1"/>
+                </a:solidFill>
+                <a:effectLst/>
+                <a:latin typeface="+mn-lt"/>
+                <a:ea typeface="+mn-ea"/>
+                <a:cs typeface="+mn-cs"/>
+              </a:rPr>
+              <a:t>|    symbol:   variable Foo</a:t>
+            </a:r>
+          </a:p>
+          <a:p>
+            <a:r>
+              <a:rPr lang="en-US" sz="1200" kern="1200" dirty="0">
+                <a:solidFill>
+                  <a:schemeClr val="tx1"/>
+                </a:solidFill>
+                <a:effectLst/>
+                <a:latin typeface="+mn-lt"/>
+                <a:ea typeface="+mn-ea"/>
+                <a:cs typeface="+mn-cs"/>
+              </a:rPr>
+              <a:t>|  Foo </a:t>
+            </a:r>
+            <a:r>
+              <a:rPr lang="en-US" sz="1200" kern="1200" dirty="0" err="1">
+                <a:solidFill>
+                  <a:schemeClr val="tx1"/>
+                </a:solidFill>
+                <a:effectLst/>
+                <a:latin typeface="+mn-lt"/>
+                <a:ea typeface="+mn-ea"/>
+                <a:cs typeface="+mn-cs"/>
+              </a:rPr>
+              <a:t>instanceof</a:t>
+            </a:r>
+            <a:r>
+              <a:rPr lang="en-US" sz="1200" kern="1200" dirty="0">
+                <a:solidFill>
+                  <a:schemeClr val="tx1"/>
+                </a:solidFill>
+                <a:effectLst/>
+                <a:latin typeface="+mn-lt"/>
+                <a:ea typeface="+mn-ea"/>
+                <a:cs typeface="+mn-cs"/>
+              </a:rPr>
+              <a:t> Class</a:t>
+            </a:r>
+          </a:p>
+          <a:p>
+            <a:r>
+              <a:rPr lang="en-US" sz="1200" kern="1200" dirty="0">
+                <a:solidFill>
+                  <a:schemeClr val="tx1"/>
+                </a:solidFill>
+                <a:effectLst/>
+                <a:latin typeface="+mn-lt"/>
+                <a:ea typeface="+mn-ea"/>
+                <a:cs typeface="+mn-cs"/>
+              </a:rPr>
+              <a:t>|  ^-^</a:t>
+            </a:r>
+          </a:p>
+          <a:p>
+            <a:endParaRPr lang="en-US" sz="1200" kern="1200" dirty="0">
+              <a:solidFill>
+                <a:schemeClr val="tx1"/>
+              </a:solidFill>
+              <a:effectLst/>
+              <a:latin typeface="+mn-lt"/>
+              <a:ea typeface="+mn-ea"/>
+              <a:cs typeface="+mn-cs"/>
+            </a:endParaRPr>
+          </a:p>
+          <a:p>
+            <a:r>
+              <a:rPr lang="en-US" sz="1200" kern="1200" dirty="0" err="1">
+                <a:solidFill>
+                  <a:schemeClr val="tx1"/>
+                </a:solidFill>
+                <a:effectLst/>
+                <a:latin typeface="+mn-lt"/>
+                <a:ea typeface="+mn-ea"/>
+                <a:cs typeface="+mn-cs"/>
+              </a:rPr>
+              <a:t>jshell</a:t>
+            </a:r>
+            <a:r>
+              <a:rPr lang="en-US" sz="1200" kern="1200" dirty="0">
+                <a:solidFill>
+                  <a:schemeClr val="tx1"/>
+                </a:solidFill>
+                <a:effectLst/>
+                <a:latin typeface="+mn-lt"/>
+                <a:ea typeface="+mn-ea"/>
+                <a:cs typeface="+mn-cs"/>
+              </a:rPr>
+              <a:t>&gt; </a:t>
+            </a:r>
+            <a:r>
+              <a:rPr lang="en-US" sz="1200" kern="1200" dirty="0" err="1">
+                <a:solidFill>
+                  <a:schemeClr val="tx1"/>
+                </a:solidFill>
+                <a:effectLst/>
+                <a:latin typeface="+mn-lt"/>
+                <a:ea typeface="+mn-ea"/>
+                <a:cs typeface="+mn-cs"/>
+              </a:rPr>
+              <a:t>Foo.class</a:t>
+            </a:r>
+            <a:r>
+              <a:rPr lang="en-US" sz="1200" kern="1200" dirty="0">
+                <a:solidFill>
+                  <a:schemeClr val="tx1"/>
+                </a:solidFill>
+                <a:effectLst/>
+                <a:latin typeface="+mn-lt"/>
+                <a:ea typeface="+mn-ea"/>
+                <a:cs typeface="+mn-cs"/>
+              </a:rPr>
+              <a:t> </a:t>
+            </a:r>
+            <a:r>
+              <a:rPr lang="en-US" sz="1200" kern="1200" dirty="0" err="1">
+                <a:solidFill>
+                  <a:schemeClr val="tx1"/>
+                </a:solidFill>
+                <a:effectLst/>
+                <a:latin typeface="+mn-lt"/>
+                <a:ea typeface="+mn-ea"/>
+                <a:cs typeface="+mn-cs"/>
+              </a:rPr>
+              <a:t>instanceof</a:t>
+            </a:r>
+            <a:r>
+              <a:rPr lang="en-US" sz="1200" kern="1200" dirty="0">
+                <a:solidFill>
+                  <a:schemeClr val="tx1"/>
+                </a:solidFill>
+                <a:effectLst/>
+                <a:latin typeface="+mn-lt"/>
+                <a:ea typeface="+mn-ea"/>
+                <a:cs typeface="+mn-cs"/>
+              </a:rPr>
+              <a:t> Class</a:t>
+            </a:r>
+          </a:p>
+          <a:p>
+            <a:r>
+              <a:rPr lang="en-US" sz="1200" kern="1200" dirty="0">
+                <a:solidFill>
+                  <a:schemeClr val="tx1"/>
+                </a:solidFill>
+                <a:effectLst/>
+                <a:latin typeface="+mn-lt"/>
+                <a:ea typeface="+mn-ea"/>
+                <a:cs typeface="+mn-cs"/>
+              </a:rPr>
+              <a:t>$2 ==&gt; true</a:t>
+            </a:r>
+          </a:p>
+          <a:p>
+            <a:br>
+              <a:rPr lang="en-US" sz="1200" kern="1200" dirty="0">
+                <a:solidFill>
+                  <a:schemeClr val="tx1"/>
+                </a:solidFill>
+                <a:effectLst/>
+                <a:latin typeface="+mn-lt"/>
+                <a:ea typeface="+mn-ea"/>
+                <a:cs typeface="+mn-cs"/>
+              </a:rPr>
+            </a:br>
+            <a:r>
+              <a:rPr lang="en-US" sz="1200" kern="1200" dirty="0" err="1">
+                <a:solidFill>
+                  <a:schemeClr val="tx1"/>
+                </a:solidFill>
+                <a:effectLst/>
+                <a:latin typeface="+mn-lt"/>
+                <a:ea typeface="+mn-ea"/>
+                <a:cs typeface="+mn-cs"/>
+              </a:rPr>
+              <a:t>jshell</a:t>
+            </a:r>
+            <a:r>
+              <a:rPr lang="en-US" sz="1200" kern="1200" dirty="0">
+                <a:solidFill>
+                  <a:schemeClr val="tx1"/>
+                </a:solidFill>
+                <a:effectLst/>
+                <a:latin typeface="+mn-lt"/>
+                <a:ea typeface="+mn-ea"/>
+                <a:cs typeface="+mn-cs"/>
+              </a:rPr>
+              <a:t>&gt; </a:t>
+            </a:r>
+            <a:r>
+              <a:rPr lang="en-US" sz="1200" kern="1200" dirty="0" err="1">
+                <a:solidFill>
+                  <a:schemeClr val="tx1"/>
+                </a:solidFill>
+                <a:effectLst/>
+                <a:latin typeface="+mn-lt"/>
+                <a:ea typeface="+mn-ea"/>
+                <a:cs typeface="+mn-cs"/>
+              </a:rPr>
+              <a:t>var</a:t>
+            </a:r>
+            <a:r>
+              <a:rPr lang="en-US" sz="1200" kern="1200" dirty="0">
+                <a:solidFill>
+                  <a:schemeClr val="tx1"/>
+                </a:solidFill>
+                <a:effectLst/>
+                <a:latin typeface="+mn-lt"/>
+                <a:ea typeface="+mn-ea"/>
+                <a:cs typeface="+mn-cs"/>
+              </a:rPr>
+              <a:t> f = new Foo();</a:t>
+            </a:r>
+          </a:p>
+          <a:p>
+            <a:r>
+              <a:rPr lang="en-US" sz="1200" kern="1200" dirty="0">
+                <a:solidFill>
+                  <a:schemeClr val="tx1"/>
+                </a:solidFill>
+                <a:effectLst/>
+                <a:latin typeface="+mn-lt"/>
+                <a:ea typeface="+mn-ea"/>
+                <a:cs typeface="+mn-cs"/>
+              </a:rPr>
+              <a:t>f ==&gt; Foo@439f5b3d</a:t>
+            </a:r>
+          </a:p>
+          <a:p>
+            <a:endParaRPr lang="en-US" sz="1200" kern="1200" dirty="0">
+              <a:solidFill>
+                <a:schemeClr val="tx1"/>
+              </a:solidFill>
+              <a:effectLst/>
+              <a:latin typeface="+mn-lt"/>
+              <a:ea typeface="+mn-ea"/>
+              <a:cs typeface="+mn-cs"/>
+            </a:endParaRPr>
+          </a:p>
+          <a:p>
+            <a:r>
+              <a:rPr lang="en-US" sz="1200" kern="1200" dirty="0" err="1">
+                <a:solidFill>
+                  <a:schemeClr val="tx1"/>
+                </a:solidFill>
+                <a:effectLst/>
+                <a:latin typeface="+mn-lt"/>
+                <a:ea typeface="+mn-ea"/>
+                <a:cs typeface="+mn-cs"/>
+              </a:rPr>
+              <a:t>jshell</a:t>
+            </a:r>
+            <a:r>
+              <a:rPr lang="en-US" sz="1200" kern="1200" dirty="0">
+                <a:solidFill>
+                  <a:schemeClr val="tx1"/>
+                </a:solidFill>
+                <a:effectLst/>
+                <a:latin typeface="+mn-lt"/>
+                <a:ea typeface="+mn-ea"/>
+                <a:cs typeface="+mn-cs"/>
+              </a:rPr>
+              <a:t>&gt; f </a:t>
+            </a:r>
+            <a:r>
+              <a:rPr lang="en-US" sz="1200" kern="1200" dirty="0" err="1">
+                <a:solidFill>
+                  <a:schemeClr val="tx1"/>
+                </a:solidFill>
+                <a:effectLst/>
+                <a:latin typeface="+mn-lt"/>
+                <a:ea typeface="+mn-ea"/>
+                <a:cs typeface="+mn-cs"/>
+              </a:rPr>
+              <a:t>instanceof</a:t>
+            </a:r>
+            <a:r>
+              <a:rPr lang="en-US" sz="1200" kern="1200" dirty="0">
+                <a:solidFill>
+                  <a:schemeClr val="tx1"/>
+                </a:solidFill>
+                <a:effectLst/>
+                <a:latin typeface="+mn-lt"/>
+                <a:ea typeface="+mn-ea"/>
+                <a:cs typeface="+mn-cs"/>
+              </a:rPr>
+              <a:t> Foo</a:t>
+            </a:r>
+          </a:p>
+          <a:p>
+            <a:r>
+              <a:rPr lang="en-US" sz="1200" kern="1200" dirty="0">
+                <a:solidFill>
+                  <a:schemeClr val="tx1"/>
+                </a:solidFill>
+                <a:effectLst/>
+                <a:latin typeface="+mn-lt"/>
+                <a:ea typeface="+mn-ea"/>
+                <a:cs typeface="+mn-cs"/>
+              </a:rPr>
+              <a:t>$4 ==&gt; true</a:t>
+            </a:r>
+            <a:br>
+              <a:rPr lang="en-US" sz="1200" kern="1200" dirty="0">
+                <a:solidFill>
+                  <a:schemeClr val="tx1"/>
+                </a:solidFill>
+                <a:effectLst/>
+                <a:latin typeface="+mn-lt"/>
+                <a:ea typeface="+mn-ea"/>
+                <a:cs typeface="+mn-cs"/>
+              </a:rPr>
+            </a:br>
+            <a:endParaRPr lang="en-US" sz="1200" kern="1200" dirty="0">
+              <a:solidFill>
+                <a:schemeClr val="tx1"/>
+              </a:solidFill>
+              <a:effectLst/>
+              <a:latin typeface="+mn-lt"/>
+              <a:ea typeface="+mn-ea"/>
+              <a:cs typeface="+mn-cs"/>
+            </a:endParaRPr>
+          </a:p>
+          <a:p>
+            <a:r>
+              <a:rPr lang="en-US" sz="1200" kern="1200" dirty="0" err="1">
+                <a:solidFill>
+                  <a:schemeClr val="tx1"/>
+                </a:solidFill>
+                <a:effectLst/>
+                <a:latin typeface="+mn-lt"/>
+                <a:ea typeface="+mn-ea"/>
+                <a:cs typeface="+mn-cs"/>
+              </a:rPr>
+              <a:t>jshell</a:t>
+            </a:r>
+            <a:r>
+              <a:rPr lang="en-US" sz="1200" kern="1200" dirty="0">
+                <a:solidFill>
+                  <a:schemeClr val="tx1"/>
+                </a:solidFill>
+                <a:effectLst/>
+                <a:latin typeface="+mn-lt"/>
+                <a:ea typeface="+mn-ea"/>
+                <a:cs typeface="+mn-cs"/>
+              </a:rPr>
+              <a:t>&gt; f </a:t>
+            </a:r>
+            <a:r>
+              <a:rPr lang="en-US" sz="1200" kern="1200" dirty="0" err="1">
+                <a:solidFill>
+                  <a:schemeClr val="tx1"/>
+                </a:solidFill>
+                <a:effectLst/>
+                <a:latin typeface="+mn-lt"/>
+                <a:ea typeface="+mn-ea"/>
+                <a:cs typeface="+mn-cs"/>
+              </a:rPr>
+              <a:t>instanceof</a:t>
+            </a:r>
+            <a:r>
+              <a:rPr lang="en-US" sz="1200" kern="1200" dirty="0">
+                <a:solidFill>
+                  <a:schemeClr val="tx1"/>
+                </a:solidFill>
+                <a:effectLst/>
+                <a:latin typeface="+mn-lt"/>
+                <a:ea typeface="+mn-ea"/>
+                <a:cs typeface="+mn-cs"/>
+              </a:rPr>
+              <a:t> Class</a:t>
+            </a:r>
+          </a:p>
+          <a:p>
+            <a:r>
+              <a:rPr lang="en-US" sz="1200" kern="1200" dirty="0">
+                <a:solidFill>
+                  <a:schemeClr val="tx1"/>
+                </a:solidFill>
+                <a:effectLst/>
+                <a:latin typeface="+mn-lt"/>
+                <a:ea typeface="+mn-ea"/>
+                <a:cs typeface="+mn-cs"/>
+              </a:rPr>
+              <a:t>|  Error:</a:t>
+            </a:r>
+          </a:p>
+          <a:p>
+            <a:r>
+              <a:rPr lang="en-US" sz="1200" kern="1200" dirty="0">
+                <a:solidFill>
+                  <a:schemeClr val="tx1"/>
+                </a:solidFill>
+                <a:effectLst/>
+                <a:latin typeface="+mn-lt"/>
+                <a:ea typeface="+mn-ea"/>
+                <a:cs typeface="+mn-cs"/>
+              </a:rPr>
+              <a:t>|  incompatible types: Foo cannot be converted to </a:t>
+            </a:r>
+            <a:r>
+              <a:rPr lang="en-US" sz="1200" kern="1200" dirty="0" err="1">
+                <a:solidFill>
+                  <a:schemeClr val="tx1"/>
+                </a:solidFill>
+                <a:effectLst/>
+                <a:latin typeface="+mn-lt"/>
+                <a:ea typeface="+mn-ea"/>
+                <a:cs typeface="+mn-cs"/>
+              </a:rPr>
+              <a:t>java.lang.Class</a:t>
+            </a:r>
+            <a:endParaRPr lang="en-US" sz="1200" kern="1200" dirty="0">
+              <a:solidFill>
+                <a:schemeClr val="tx1"/>
+              </a:solidFill>
+              <a:effectLst/>
+              <a:latin typeface="+mn-lt"/>
+              <a:ea typeface="+mn-ea"/>
+              <a:cs typeface="+mn-cs"/>
+            </a:endParaRPr>
+          </a:p>
+          <a:p>
+            <a:r>
+              <a:rPr lang="en-US" sz="1200" kern="1200" dirty="0">
+                <a:solidFill>
+                  <a:schemeClr val="tx1"/>
+                </a:solidFill>
+                <a:effectLst/>
+                <a:latin typeface="+mn-lt"/>
+                <a:ea typeface="+mn-ea"/>
+                <a:cs typeface="+mn-cs"/>
+              </a:rPr>
+              <a:t>|  f </a:t>
+            </a:r>
+            <a:r>
+              <a:rPr lang="en-US" sz="1200" kern="1200" dirty="0" err="1">
+                <a:solidFill>
+                  <a:schemeClr val="tx1"/>
+                </a:solidFill>
+                <a:effectLst/>
+                <a:latin typeface="+mn-lt"/>
+                <a:ea typeface="+mn-ea"/>
+                <a:cs typeface="+mn-cs"/>
+              </a:rPr>
+              <a:t>instanceof</a:t>
+            </a:r>
+            <a:r>
+              <a:rPr lang="en-US" sz="1200" kern="1200" dirty="0">
+                <a:solidFill>
+                  <a:schemeClr val="tx1"/>
+                </a:solidFill>
+                <a:effectLst/>
+                <a:latin typeface="+mn-lt"/>
+                <a:ea typeface="+mn-ea"/>
+                <a:cs typeface="+mn-cs"/>
+              </a:rPr>
+              <a:t> Class</a:t>
+            </a:r>
+          </a:p>
+          <a:p>
+            <a:r>
+              <a:rPr lang="en-US" sz="1200" kern="1200" dirty="0">
+                <a:solidFill>
+                  <a:schemeClr val="tx1"/>
+                </a:solidFill>
+                <a:effectLst/>
+                <a:latin typeface="+mn-lt"/>
+                <a:ea typeface="+mn-ea"/>
+                <a:cs typeface="+mn-cs"/>
+              </a:rPr>
+              <a:t>|  ^</a:t>
+            </a:r>
+          </a:p>
+          <a:p>
+            <a:br>
+              <a:rPr lang="en-US" sz="1200" kern="1200" dirty="0">
+                <a:solidFill>
+                  <a:schemeClr val="tx1"/>
+                </a:solidFill>
+                <a:effectLst/>
+                <a:latin typeface="+mn-lt"/>
+                <a:ea typeface="+mn-ea"/>
+                <a:cs typeface="+mn-cs"/>
+              </a:rPr>
+            </a:br>
+            <a:r>
+              <a:rPr lang="en-US" sz="1200" kern="1200" dirty="0" err="1">
+                <a:solidFill>
+                  <a:schemeClr val="tx1"/>
+                </a:solidFill>
+                <a:effectLst/>
+                <a:latin typeface="+mn-lt"/>
+                <a:ea typeface="+mn-ea"/>
+                <a:cs typeface="+mn-cs"/>
+              </a:rPr>
+              <a:t>jshell</a:t>
+            </a:r>
+            <a:r>
+              <a:rPr lang="en-US" sz="1200" kern="1200" dirty="0">
+                <a:solidFill>
+                  <a:schemeClr val="tx1"/>
+                </a:solidFill>
+                <a:effectLst/>
+                <a:latin typeface="+mn-lt"/>
+                <a:ea typeface="+mn-ea"/>
+                <a:cs typeface="+mn-cs"/>
+              </a:rPr>
+              <a:t>&gt; </a:t>
+            </a:r>
+            <a:r>
+              <a:rPr lang="en-US" sz="1200" kern="1200" dirty="0" err="1">
+                <a:solidFill>
+                  <a:schemeClr val="tx1"/>
+                </a:solidFill>
+                <a:effectLst/>
+                <a:latin typeface="+mn-lt"/>
+                <a:ea typeface="+mn-ea"/>
+                <a:cs typeface="+mn-cs"/>
+              </a:rPr>
+              <a:t>f.getClass</a:t>
+            </a:r>
+            <a:r>
+              <a:rPr lang="en-US" sz="1200" kern="1200" dirty="0">
+                <a:solidFill>
+                  <a:schemeClr val="tx1"/>
+                </a:solidFill>
+                <a:effectLst/>
+                <a:latin typeface="+mn-lt"/>
+                <a:ea typeface="+mn-ea"/>
+                <a:cs typeface="+mn-cs"/>
+              </a:rPr>
+              <a:t>() </a:t>
+            </a:r>
+            <a:r>
+              <a:rPr lang="en-US" sz="1200" kern="1200" dirty="0" err="1">
+                <a:solidFill>
+                  <a:schemeClr val="tx1"/>
+                </a:solidFill>
+                <a:effectLst/>
+                <a:latin typeface="+mn-lt"/>
+                <a:ea typeface="+mn-ea"/>
+                <a:cs typeface="+mn-cs"/>
+              </a:rPr>
+              <a:t>instanceof</a:t>
+            </a:r>
+            <a:r>
+              <a:rPr lang="en-US" sz="1200" kern="1200" dirty="0">
+                <a:solidFill>
+                  <a:schemeClr val="tx1"/>
+                </a:solidFill>
+                <a:effectLst/>
+                <a:latin typeface="+mn-lt"/>
+                <a:ea typeface="+mn-ea"/>
+                <a:cs typeface="+mn-cs"/>
+              </a:rPr>
+              <a:t> Class</a:t>
+            </a:r>
+          </a:p>
+          <a:p>
+            <a:r>
+              <a:rPr lang="en-US" sz="1200" kern="1200" dirty="0">
+                <a:solidFill>
+                  <a:schemeClr val="tx1"/>
+                </a:solidFill>
+                <a:effectLst/>
+                <a:latin typeface="+mn-lt"/>
+                <a:ea typeface="+mn-ea"/>
+                <a:cs typeface="+mn-cs"/>
+              </a:rPr>
+              <a:t>$5 ==&gt; true</a:t>
+            </a:r>
+          </a:p>
+          <a:p>
             <a:endParaRPr lang="en-US" dirty="0"/>
           </a:p>
         </p:txBody>
@@ -829,7 +1543,7 @@
           <a:p>
             <a:r>
               <a:rPr lang="en-US"/>
-              <a:t>Fall 2020</a:t>
+              <a:t>Spring 2021</a:t>
             </a:r>
           </a:p>
         </p:txBody>
@@ -1245,7 +1959,7 @@
           <a:p>
             <a:r>
               <a:rPr lang="en-US"/>
-              <a:t>Fall 2020</a:t>
+              <a:t>Spring 2021</a:t>
             </a:r>
           </a:p>
         </p:txBody>
@@ -1583,7 +2297,7 @@
           <a:p>
             <a:r>
               <a:rPr lang="en-US"/>
-              <a:t>Fall 2020</a:t>
+              <a:t>Spring 2021</a:t>
             </a:r>
           </a:p>
         </p:txBody>
@@ -1990,7 +2704,7 @@
           <a:p>
             <a:r>
               <a:rPr lang="en-US"/>
-              <a:t>Fall 2020</a:t>
+              <a:t>Spring 2021</a:t>
             </a:r>
           </a:p>
         </p:txBody>
@@ -2560,7 +3274,7 @@
           <a:p>
             <a:r>
               <a:rPr lang="en-US"/>
-              <a:t>Fall 2020</a:t>
+              <a:t>Spring 2021</a:t>
             </a:r>
           </a:p>
         </p:txBody>
@@ -3243,7 +3957,7 @@
           <a:p>
             <a:r>
               <a:rPr lang="en-US"/>
-              <a:t>Fall 2020</a:t>
+              <a:t>Spring 2021</a:t>
             </a:r>
           </a:p>
         </p:txBody>
@@ -4158,7 +4872,7 @@
           <a:p>
             <a:r>
               <a:rPr lang="en-US"/>
-              <a:t>Fall 2020</a:t>
+              <a:t>Spring 2021</a:t>
             </a:r>
           </a:p>
         </p:txBody>
@@ -4473,7 +5187,7 @@
           <a:p>
             <a:r>
               <a:rPr lang="en-US"/>
-              <a:t>Fall 2020</a:t>
+              <a:t>Spring 2021</a:t>
             </a:r>
           </a:p>
         </p:txBody>
@@ -4739,7 +5453,7 @@
           <a:p>
             <a:r>
               <a:rPr lang="en-US"/>
-              <a:t>Fall 2020</a:t>
+              <a:t>Spring 2021</a:t>
             </a:r>
           </a:p>
         </p:txBody>
@@ -5064,7 +5778,7 @@
           <a:p>
             <a:r>
               <a:rPr lang="en-US"/>
-              <a:t>Fall 2020</a:t>
+              <a:t>Spring 2021</a:t>
             </a:r>
           </a:p>
         </p:txBody>
@@ -5455,7 +6169,7 @@
           <a:p>
             <a:r>
               <a:rPr lang="en-US"/>
-              <a:t>Fall 2020</a:t>
+              <a:t>Spring 2021</a:t>
             </a:r>
           </a:p>
         </p:txBody>
@@ -5833,7 +6547,7 @@
           <a:p>
             <a:r>
               <a:rPr lang="en-US"/>
-              <a:t>Fall 2020</a:t>
+              <a:t>Spring 2021</a:t>
             </a:r>
           </a:p>
         </p:txBody>
@@ -6341,7 +7055,7 @@
           <a:p>
             <a:r>
               <a:rPr lang="en-US"/>
-              <a:t>Fall 2020</a:t>
+              <a:t>Spring 2021</a:t>
             </a:r>
           </a:p>
         </p:txBody>
@@ -6600,7 +7314,7 @@
           <a:p>
             <a:r>
               <a:rPr lang="en-US"/>
-              <a:t>Fall 2020</a:t>
+              <a:t>Spring 2021</a:t>
             </a:r>
           </a:p>
         </p:txBody>
@@ -6765,7 +7479,7 @@
           <a:p>
             <a:r>
               <a:rPr lang="en-US"/>
-              <a:t>Fall 2020</a:t>
+              <a:t>Spring 2021</a:t>
             </a:r>
           </a:p>
         </p:txBody>
@@ -7157,7 +7871,7 @@
           <a:p>
             <a:r>
               <a:rPr lang="en-US"/>
-              <a:t>Fall 2020</a:t>
+              <a:t>Spring 2021</a:t>
             </a:r>
           </a:p>
         </p:txBody>
@@ -7568,7 +8282,7 @@
           <a:p>
             <a:r>
               <a:rPr lang="en-US"/>
-              <a:t>Fall 2020</a:t>
+              <a:t>Spring 2021</a:t>
             </a:r>
           </a:p>
         </p:txBody>
@@ -7814,7 +8528,7 @@
           <a:p>
             <a:r>
               <a:rPr lang="en-US"/>
-              <a:t>Fall 2020</a:t>
+              <a:t>Spring 2021</a:t>
             </a:r>
           </a:p>
         </p:txBody>
@@ -8297,7 +9011,7 @@
           <a:p>
             <a:r>
               <a:rPr lang="en-US" dirty="0"/>
-              <a:t>Fall 2020</a:t>
+              <a:t>Spring 2021</a:t>
             </a:r>
           </a:p>
         </p:txBody>
@@ -8635,7 +9349,7 @@
           <a:p>
             <a:r>
               <a:rPr lang="en-US"/>
-              <a:t>Fall 2020</a:t>
+              <a:t>Spring 2021</a:t>
             </a:r>
           </a:p>
         </p:txBody>
@@ -9026,7 +9740,7 @@
           <a:p>
             <a:r>
               <a:rPr lang="en-US"/>
-              <a:t>Fall 2020</a:t>
+              <a:t>Spring 2021</a:t>
             </a:r>
           </a:p>
         </p:txBody>
@@ -9486,7 +10200,7 @@
           <a:p>
             <a:r>
               <a:rPr lang="en-US"/>
-              <a:t>Fall 2020</a:t>
+              <a:t>Spring 2021</a:t>
             </a:r>
           </a:p>
         </p:txBody>
@@ -9846,7 +10560,7 @@
             <a:pPr lvl="1"/>
             <a:r>
               <a:rPr lang="en-US" dirty="0"/>
-              <a:t>scale, check</a:t>
+              <a:t>scale, print, check</a:t>
             </a:r>
           </a:p>
           <a:p>
@@ -9893,7 +10607,7 @@
           <a:p>
             <a:r>
               <a:rPr lang="en-US"/>
-              <a:t>Fall 2020</a:t>
+              <a:t>Spring 2021</a:t>
             </a:r>
           </a:p>
         </p:txBody>
@@ -10627,7 +11341,7 @@
         </p:nvSpPr>
         <p:spPr>
           <a:xfrm>
-            <a:off x="680321" y="2336873"/>
+            <a:off x="255040" y="2106041"/>
             <a:ext cx="9613861" cy="2033246"/>
           </a:xfrm>
         </p:spPr>
@@ -10736,7 +11450,7 @@
           <a:p>
             <a:r>
               <a:rPr lang="en-US"/>
-              <a:t>Fall 2020</a:t>
+              <a:t>Spring 2021</a:t>
             </a:r>
           </a:p>
         </p:txBody>
@@ -10783,8 +11497,8 @@
         </p:nvSpPr>
         <p:spPr>
           <a:xfrm>
-            <a:off x="1864426" y="4738254"/>
-            <a:ext cx="8312727" cy="1477328"/>
+            <a:off x="905923" y="4595539"/>
+            <a:ext cx="9987148" cy="1477328"/>
           </a:xfrm>
           <a:prstGeom prst="rect">
             <a:avLst/>
@@ -10870,13 +11584,13 @@
           <a:p>
             <a:r>
               <a:rPr lang="en-US" dirty="0"/>
-              <a:t>        - adds new symbol(s)+value(s) to environment, returns new environment</a:t>
+              <a:t>        - adds new symbol(s)+value(s) node to environment chain, returns new head of chain</a:t>
             </a:r>
           </a:p>
           <a:p>
             <a:r>
               <a:rPr lang="en-US" dirty="0"/>
-              <a:t>    </a:t>
+              <a:t>    ENV_</a:t>
             </a:r>
             <a:r>
               <a:rPr lang="en-US" dirty="0">
@@ -10921,7 +11635,7 @@
         </p:nvSpPr>
         <p:spPr>
           <a:xfrm>
-            <a:off x="4488873" y="4369521"/>
+            <a:off x="3576374" y="4203820"/>
             <a:ext cx="2254143" cy="369332"/>
           </a:xfrm>
           <a:prstGeom prst="rect">
@@ -10936,12 +11650,1086 @@
           <a:lstStyle/>
           <a:p>
             <a:r>
-              <a:rPr lang="en-US" i="1" dirty="0"/>
+              <a:rPr lang="en-US" i="1" dirty="0">
+                <a:solidFill>
+                  <a:schemeClr val="accent3">
+                    <a:lumMod val="60000"/>
+                    <a:lumOff val="40000"/>
+                  </a:schemeClr>
+                </a:solidFill>
+              </a:rPr>
               <a:t>simplified interface</a:t>
             </a:r>
           </a:p>
         </p:txBody>
       </p:sp>
+      <p:sp>
+        <p:nvSpPr>
+          <p:cNvPr id="8" name="Rectangle 7">
+            <a:extLst>
+              <a:ext uri="{FF2B5EF4-FFF2-40B4-BE49-F238E27FC236}">
+                <a16:creationId xmlns:a16="http://schemas.microsoft.com/office/drawing/2014/main" id="{ECA319AC-8002-1341-ADCB-FC9E444E57A4}"/>
+              </a:ext>
+            </a:extLst>
+          </p:cNvPr>
+          <p:cNvSpPr/>
+          <p:nvPr/>
+        </p:nvSpPr>
+        <p:spPr>
+          <a:xfrm>
+            <a:off x="6421522" y="3813930"/>
+            <a:ext cx="344384" cy="261257"/>
+          </a:xfrm>
+          <a:prstGeom prst="rect">
+            <a:avLst/>
+          </a:prstGeom>
+        </p:spPr>
+        <p:style>
+          <a:lnRef idx="2">
+            <a:schemeClr val="accent1">
+              <a:shade val="50000"/>
+            </a:schemeClr>
+          </a:lnRef>
+          <a:fillRef idx="1">
+            <a:schemeClr val="accent1"/>
+          </a:fillRef>
+          <a:effectRef idx="0">
+            <a:schemeClr val="accent1"/>
+          </a:effectRef>
+          <a:fontRef idx="minor">
+            <a:schemeClr val="lt1"/>
+          </a:fontRef>
+        </p:style>
+        <p:txBody>
+          <a:bodyPr rtlCol="0" anchor="ctr"/>
+          <a:lstStyle/>
+          <a:p>
+            <a:pPr algn="ctr"/>
+            <a:endParaRPr lang="en-US"/>
+          </a:p>
+        </p:txBody>
+      </p:sp>
+      <p:sp>
+        <p:nvSpPr>
+          <p:cNvPr id="9" name="Rectangle 8">
+            <a:extLst>
+              <a:ext uri="{FF2B5EF4-FFF2-40B4-BE49-F238E27FC236}">
+                <a16:creationId xmlns:a16="http://schemas.microsoft.com/office/drawing/2014/main" id="{A43044C6-A27E-4647-A1BA-FB56CA19E3BA}"/>
+              </a:ext>
+            </a:extLst>
+          </p:cNvPr>
+          <p:cNvSpPr/>
+          <p:nvPr/>
+        </p:nvSpPr>
+        <p:spPr>
+          <a:xfrm>
+            <a:off x="6421522" y="3570485"/>
+            <a:ext cx="344384" cy="261257"/>
+          </a:xfrm>
+          <a:prstGeom prst="rect">
+            <a:avLst/>
+          </a:prstGeom>
+        </p:spPr>
+        <p:style>
+          <a:lnRef idx="2">
+            <a:schemeClr val="accent1">
+              <a:shade val="50000"/>
+            </a:schemeClr>
+          </a:lnRef>
+          <a:fillRef idx="1">
+            <a:schemeClr val="accent1"/>
+          </a:fillRef>
+          <a:effectRef idx="0">
+            <a:schemeClr val="accent1"/>
+          </a:effectRef>
+          <a:fontRef idx="minor">
+            <a:schemeClr val="lt1"/>
+          </a:fontRef>
+        </p:style>
+        <p:txBody>
+          <a:bodyPr rtlCol="0" anchor="ctr"/>
+          <a:lstStyle/>
+          <a:p>
+            <a:pPr algn="ctr"/>
+            <a:endParaRPr lang="en-US"/>
+          </a:p>
+        </p:txBody>
+      </p:sp>
+      <p:sp>
+        <p:nvSpPr>
+          <p:cNvPr id="10" name="Rectangle 9">
+            <a:extLst>
+              <a:ext uri="{FF2B5EF4-FFF2-40B4-BE49-F238E27FC236}">
+                <a16:creationId xmlns:a16="http://schemas.microsoft.com/office/drawing/2014/main" id="{E78101B1-6154-0E40-AC49-2982BB833D18}"/>
+              </a:ext>
+            </a:extLst>
+          </p:cNvPr>
+          <p:cNvSpPr/>
+          <p:nvPr/>
+        </p:nvSpPr>
+        <p:spPr>
+          <a:xfrm>
+            <a:off x="6421522" y="4073192"/>
+            <a:ext cx="344384" cy="261257"/>
+          </a:xfrm>
+          <a:prstGeom prst="rect">
+            <a:avLst/>
+          </a:prstGeom>
+        </p:spPr>
+        <p:style>
+          <a:lnRef idx="2">
+            <a:schemeClr val="accent1">
+              <a:shade val="50000"/>
+            </a:schemeClr>
+          </a:lnRef>
+          <a:fillRef idx="1">
+            <a:schemeClr val="accent1"/>
+          </a:fillRef>
+          <a:effectRef idx="0">
+            <a:schemeClr val="accent1"/>
+          </a:effectRef>
+          <a:fontRef idx="minor">
+            <a:schemeClr val="lt1"/>
+          </a:fontRef>
+        </p:style>
+        <p:txBody>
+          <a:bodyPr rtlCol="0" anchor="ctr"/>
+          <a:lstStyle/>
+          <a:p>
+            <a:pPr algn="ctr"/>
+            <a:endParaRPr lang="en-US"/>
+          </a:p>
+        </p:txBody>
+      </p:sp>
+      <p:sp>
+        <p:nvSpPr>
+          <p:cNvPr id="11" name="Rectangle 10">
+            <a:extLst>
+              <a:ext uri="{FF2B5EF4-FFF2-40B4-BE49-F238E27FC236}">
+                <a16:creationId xmlns:a16="http://schemas.microsoft.com/office/drawing/2014/main" id="{20F4C7ED-A65C-F440-86A6-E8A4CB4A6F02}"/>
+              </a:ext>
+            </a:extLst>
+          </p:cNvPr>
+          <p:cNvSpPr/>
+          <p:nvPr/>
+        </p:nvSpPr>
+        <p:spPr>
+          <a:xfrm>
+            <a:off x="8181238" y="3439856"/>
+            <a:ext cx="344384" cy="261257"/>
+          </a:xfrm>
+          <a:prstGeom prst="rect">
+            <a:avLst/>
+          </a:prstGeom>
+        </p:spPr>
+        <p:style>
+          <a:lnRef idx="2">
+            <a:schemeClr val="accent1">
+              <a:shade val="50000"/>
+            </a:schemeClr>
+          </a:lnRef>
+          <a:fillRef idx="1">
+            <a:schemeClr val="accent1"/>
+          </a:fillRef>
+          <a:effectRef idx="0">
+            <a:schemeClr val="accent1"/>
+          </a:effectRef>
+          <a:fontRef idx="minor">
+            <a:schemeClr val="lt1"/>
+          </a:fontRef>
+        </p:style>
+        <p:txBody>
+          <a:bodyPr rtlCol="0" anchor="ctr"/>
+          <a:lstStyle/>
+          <a:p>
+            <a:pPr algn="ctr"/>
+            <a:endParaRPr lang="en-US"/>
+          </a:p>
+        </p:txBody>
+      </p:sp>
+      <p:sp>
+        <p:nvSpPr>
+          <p:cNvPr id="12" name="Rectangle 11">
+            <a:extLst>
+              <a:ext uri="{FF2B5EF4-FFF2-40B4-BE49-F238E27FC236}">
+                <a16:creationId xmlns:a16="http://schemas.microsoft.com/office/drawing/2014/main" id="{591453DE-846F-2C42-920B-5E161E5B8207}"/>
+              </a:ext>
+            </a:extLst>
+          </p:cNvPr>
+          <p:cNvSpPr/>
+          <p:nvPr/>
+        </p:nvSpPr>
+        <p:spPr>
+          <a:xfrm>
+            <a:off x="8181238" y="3701113"/>
+            <a:ext cx="344384" cy="261257"/>
+          </a:xfrm>
+          <a:prstGeom prst="rect">
+            <a:avLst/>
+          </a:prstGeom>
+        </p:spPr>
+        <p:style>
+          <a:lnRef idx="2">
+            <a:schemeClr val="accent1">
+              <a:shade val="50000"/>
+            </a:schemeClr>
+          </a:lnRef>
+          <a:fillRef idx="1">
+            <a:schemeClr val="accent1"/>
+          </a:fillRef>
+          <a:effectRef idx="0">
+            <a:schemeClr val="accent1"/>
+          </a:effectRef>
+          <a:fontRef idx="minor">
+            <a:schemeClr val="lt1"/>
+          </a:fontRef>
+        </p:style>
+        <p:txBody>
+          <a:bodyPr rtlCol="0" anchor="ctr"/>
+          <a:lstStyle/>
+          <a:p>
+            <a:pPr algn="ctr"/>
+            <a:endParaRPr lang="en-US"/>
+          </a:p>
+        </p:txBody>
+      </p:sp>
+      <p:sp>
+        <p:nvSpPr>
+          <p:cNvPr id="13" name="Rectangle 12">
+            <a:extLst>
+              <a:ext uri="{FF2B5EF4-FFF2-40B4-BE49-F238E27FC236}">
+                <a16:creationId xmlns:a16="http://schemas.microsoft.com/office/drawing/2014/main" id="{743F21AC-15A1-F64F-AEBF-0455B5BF41E0}"/>
+              </a:ext>
+            </a:extLst>
+          </p:cNvPr>
+          <p:cNvSpPr/>
+          <p:nvPr/>
+        </p:nvSpPr>
+        <p:spPr>
+          <a:xfrm>
+            <a:off x="9612214" y="2757025"/>
+            <a:ext cx="344384" cy="261257"/>
+          </a:xfrm>
+          <a:prstGeom prst="rect">
+            <a:avLst/>
+          </a:prstGeom>
+        </p:spPr>
+        <p:style>
+          <a:lnRef idx="2">
+            <a:schemeClr val="accent1">
+              <a:shade val="50000"/>
+            </a:schemeClr>
+          </a:lnRef>
+          <a:fillRef idx="1">
+            <a:schemeClr val="accent1"/>
+          </a:fillRef>
+          <a:effectRef idx="0">
+            <a:schemeClr val="accent1"/>
+          </a:effectRef>
+          <a:fontRef idx="minor">
+            <a:schemeClr val="lt1"/>
+          </a:fontRef>
+        </p:style>
+        <p:txBody>
+          <a:bodyPr rtlCol="0" anchor="ctr"/>
+          <a:lstStyle/>
+          <a:p>
+            <a:pPr algn="ctr"/>
+            <a:endParaRPr lang="en-US"/>
+          </a:p>
+        </p:txBody>
+      </p:sp>
+      <p:sp>
+        <p:nvSpPr>
+          <p:cNvPr id="14" name="Rectangle 13">
+            <a:extLst>
+              <a:ext uri="{FF2B5EF4-FFF2-40B4-BE49-F238E27FC236}">
+                <a16:creationId xmlns:a16="http://schemas.microsoft.com/office/drawing/2014/main" id="{9F621EC8-49A6-1047-B404-29471BA5E2BB}"/>
+              </a:ext>
+            </a:extLst>
+          </p:cNvPr>
+          <p:cNvSpPr/>
+          <p:nvPr/>
+        </p:nvSpPr>
+        <p:spPr>
+          <a:xfrm>
+            <a:off x="9606276" y="3000467"/>
+            <a:ext cx="344384" cy="261257"/>
+          </a:xfrm>
+          <a:prstGeom prst="rect">
+            <a:avLst/>
+          </a:prstGeom>
+        </p:spPr>
+        <p:style>
+          <a:lnRef idx="2">
+            <a:schemeClr val="accent1">
+              <a:shade val="50000"/>
+            </a:schemeClr>
+          </a:lnRef>
+          <a:fillRef idx="1">
+            <a:schemeClr val="accent1"/>
+          </a:fillRef>
+          <a:effectRef idx="0">
+            <a:schemeClr val="accent1"/>
+          </a:effectRef>
+          <a:fontRef idx="minor">
+            <a:schemeClr val="lt1"/>
+          </a:fontRef>
+        </p:style>
+        <p:txBody>
+          <a:bodyPr rtlCol="0" anchor="ctr"/>
+          <a:lstStyle/>
+          <a:p>
+            <a:pPr algn="ctr"/>
+            <a:endParaRPr lang="en-US"/>
+          </a:p>
+        </p:txBody>
+      </p:sp>
+      <p:sp>
+        <p:nvSpPr>
+          <p:cNvPr id="15" name="Rectangle 14">
+            <a:extLst>
+              <a:ext uri="{FF2B5EF4-FFF2-40B4-BE49-F238E27FC236}">
+                <a16:creationId xmlns:a16="http://schemas.microsoft.com/office/drawing/2014/main" id="{A7C018D3-63D0-E943-B327-CAF027B5AE97}"/>
+              </a:ext>
+            </a:extLst>
+          </p:cNvPr>
+          <p:cNvSpPr/>
+          <p:nvPr/>
+        </p:nvSpPr>
+        <p:spPr>
+          <a:xfrm>
+            <a:off x="9606276" y="3261724"/>
+            <a:ext cx="344384" cy="261257"/>
+          </a:xfrm>
+          <a:prstGeom prst="rect">
+            <a:avLst/>
+          </a:prstGeom>
+        </p:spPr>
+        <p:style>
+          <a:lnRef idx="2">
+            <a:schemeClr val="accent1">
+              <a:shade val="50000"/>
+            </a:schemeClr>
+          </a:lnRef>
+          <a:fillRef idx="1">
+            <a:schemeClr val="accent1"/>
+          </a:fillRef>
+          <a:effectRef idx="0">
+            <a:schemeClr val="accent1"/>
+          </a:effectRef>
+          <a:fontRef idx="minor">
+            <a:schemeClr val="lt1"/>
+          </a:fontRef>
+        </p:style>
+        <p:txBody>
+          <a:bodyPr rtlCol="0" anchor="ctr"/>
+          <a:lstStyle/>
+          <a:p>
+            <a:pPr algn="ctr"/>
+            <a:endParaRPr lang="en-US"/>
+          </a:p>
+        </p:txBody>
+      </p:sp>
+      <p:sp>
+        <p:nvSpPr>
+          <p:cNvPr id="16" name="Rectangle 15">
+            <a:extLst>
+              <a:ext uri="{FF2B5EF4-FFF2-40B4-BE49-F238E27FC236}">
+                <a16:creationId xmlns:a16="http://schemas.microsoft.com/office/drawing/2014/main" id="{4D339504-B1F6-6548-83AE-A23C2D66D86E}"/>
+              </a:ext>
+            </a:extLst>
+          </p:cNvPr>
+          <p:cNvSpPr/>
+          <p:nvPr/>
+        </p:nvSpPr>
+        <p:spPr>
+          <a:xfrm>
+            <a:off x="9606276" y="3522981"/>
+            <a:ext cx="344384" cy="261257"/>
+          </a:xfrm>
+          <a:prstGeom prst="rect">
+            <a:avLst/>
+          </a:prstGeom>
+        </p:spPr>
+        <p:style>
+          <a:lnRef idx="2">
+            <a:schemeClr val="accent1">
+              <a:shade val="50000"/>
+            </a:schemeClr>
+          </a:lnRef>
+          <a:fillRef idx="1">
+            <a:schemeClr val="accent1"/>
+          </a:fillRef>
+          <a:effectRef idx="0">
+            <a:schemeClr val="accent1"/>
+          </a:effectRef>
+          <a:fontRef idx="minor">
+            <a:schemeClr val="lt1"/>
+          </a:fontRef>
+        </p:style>
+        <p:txBody>
+          <a:bodyPr rtlCol="0" anchor="ctr"/>
+          <a:lstStyle/>
+          <a:p>
+            <a:pPr algn="ctr"/>
+            <a:endParaRPr lang="en-US"/>
+          </a:p>
+        </p:txBody>
+      </p:sp>
+      <p:sp>
+        <p:nvSpPr>
+          <p:cNvPr id="17" name="Rectangle 16">
+            <a:extLst>
+              <a:ext uri="{FF2B5EF4-FFF2-40B4-BE49-F238E27FC236}">
+                <a16:creationId xmlns:a16="http://schemas.microsoft.com/office/drawing/2014/main" id="{A9BBBE3B-6098-F641-84A3-034FA1EFE87D}"/>
+              </a:ext>
+            </a:extLst>
+          </p:cNvPr>
+          <p:cNvSpPr/>
+          <p:nvPr/>
+        </p:nvSpPr>
+        <p:spPr>
+          <a:xfrm>
+            <a:off x="6765906" y="3813930"/>
+            <a:ext cx="687045" cy="261258"/>
+          </a:xfrm>
+          <a:prstGeom prst="rect">
+            <a:avLst/>
+          </a:prstGeom>
+          <a:solidFill>
+            <a:schemeClr val="accent4">
+              <a:lumMod val="60000"/>
+              <a:lumOff val="40000"/>
+            </a:schemeClr>
+          </a:solidFill>
+        </p:spPr>
+        <p:style>
+          <a:lnRef idx="2">
+            <a:schemeClr val="accent1">
+              <a:shade val="50000"/>
+            </a:schemeClr>
+          </a:lnRef>
+          <a:fillRef idx="1">
+            <a:schemeClr val="accent1"/>
+          </a:fillRef>
+          <a:effectRef idx="0">
+            <a:schemeClr val="accent1"/>
+          </a:effectRef>
+          <a:fontRef idx="minor">
+            <a:schemeClr val="lt1"/>
+          </a:fontRef>
+        </p:style>
+        <p:txBody>
+          <a:bodyPr rtlCol="0" anchor="ctr"/>
+          <a:lstStyle/>
+          <a:p>
+            <a:pPr algn="ctr"/>
+            <a:endParaRPr lang="en-US"/>
+          </a:p>
+        </p:txBody>
+      </p:sp>
+      <p:sp>
+        <p:nvSpPr>
+          <p:cNvPr id="18" name="Rectangle 17">
+            <a:extLst>
+              <a:ext uri="{FF2B5EF4-FFF2-40B4-BE49-F238E27FC236}">
+                <a16:creationId xmlns:a16="http://schemas.microsoft.com/office/drawing/2014/main" id="{57D2B3FF-1542-7843-A4E8-EC966A8865EB}"/>
+              </a:ext>
+            </a:extLst>
+          </p:cNvPr>
+          <p:cNvSpPr/>
+          <p:nvPr/>
+        </p:nvSpPr>
+        <p:spPr>
+          <a:xfrm>
+            <a:off x="6763516" y="3566542"/>
+            <a:ext cx="687045" cy="261258"/>
+          </a:xfrm>
+          <a:prstGeom prst="rect">
+            <a:avLst/>
+          </a:prstGeom>
+          <a:solidFill>
+            <a:schemeClr val="accent4">
+              <a:lumMod val="60000"/>
+              <a:lumOff val="40000"/>
+            </a:schemeClr>
+          </a:solidFill>
+        </p:spPr>
+        <p:style>
+          <a:lnRef idx="2">
+            <a:schemeClr val="accent1">
+              <a:shade val="50000"/>
+            </a:schemeClr>
+          </a:lnRef>
+          <a:fillRef idx="1">
+            <a:schemeClr val="accent1"/>
+          </a:fillRef>
+          <a:effectRef idx="0">
+            <a:schemeClr val="accent1"/>
+          </a:effectRef>
+          <a:fontRef idx="minor">
+            <a:schemeClr val="lt1"/>
+          </a:fontRef>
+        </p:style>
+        <p:txBody>
+          <a:bodyPr rtlCol="0" anchor="ctr"/>
+          <a:lstStyle/>
+          <a:p>
+            <a:pPr algn="ctr"/>
+            <a:endParaRPr lang="en-US"/>
+          </a:p>
+        </p:txBody>
+      </p:sp>
+      <p:sp>
+        <p:nvSpPr>
+          <p:cNvPr id="19" name="Rectangle 18">
+            <a:extLst>
+              <a:ext uri="{FF2B5EF4-FFF2-40B4-BE49-F238E27FC236}">
+                <a16:creationId xmlns:a16="http://schemas.microsoft.com/office/drawing/2014/main" id="{E1483618-1934-714E-AB5B-B922073024E3}"/>
+              </a:ext>
+            </a:extLst>
+          </p:cNvPr>
+          <p:cNvSpPr/>
+          <p:nvPr/>
+        </p:nvSpPr>
+        <p:spPr>
+          <a:xfrm>
+            <a:off x="6763516" y="4073191"/>
+            <a:ext cx="687045" cy="261258"/>
+          </a:xfrm>
+          <a:prstGeom prst="rect">
+            <a:avLst/>
+          </a:prstGeom>
+          <a:solidFill>
+            <a:schemeClr val="accent4">
+              <a:lumMod val="60000"/>
+              <a:lumOff val="40000"/>
+            </a:schemeClr>
+          </a:solidFill>
+        </p:spPr>
+        <p:style>
+          <a:lnRef idx="2">
+            <a:schemeClr val="accent1">
+              <a:shade val="50000"/>
+            </a:schemeClr>
+          </a:lnRef>
+          <a:fillRef idx="1">
+            <a:schemeClr val="accent1"/>
+          </a:fillRef>
+          <a:effectRef idx="0">
+            <a:schemeClr val="accent1"/>
+          </a:effectRef>
+          <a:fontRef idx="minor">
+            <a:schemeClr val="lt1"/>
+          </a:fontRef>
+        </p:style>
+        <p:txBody>
+          <a:bodyPr rtlCol="0" anchor="ctr"/>
+          <a:lstStyle/>
+          <a:p>
+            <a:pPr algn="ctr"/>
+            <a:endParaRPr lang="en-US"/>
+          </a:p>
+        </p:txBody>
+      </p:sp>
+      <p:sp>
+        <p:nvSpPr>
+          <p:cNvPr id="20" name="Rectangle 19">
+            <a:extLst>
+              <a:ext uri="{FF2B5EF4-FFF2-40B4-BE49-F238E27FC236}">
+                <a16:creationId xmlns:a16="http://schemas.microsoft.com/office/drawing/2014/main" id="{6C28BDD6-938D-3240-80BF-A9730611EC48}"/>
+              </a:ext>
+            </a:extLst>
+          </p:cNvPr>
+          <p:cNvSpPr/>
+          <p:nvPr/>
+        </p:nvSpPr>
+        <p:spPr>
+          <a:xfrm>
+            <a:off x="8525622" y="3431969"/>
+            <a:ext cx="687045" cy="261258"/>
+          </a:xfrm>
+          <a:prstGeom prst="rect">
+            <a:avLst/>
+          </a:prstGeom>
+          <a:solidFill>
+            <a:schemeClr val="accent4">
+              <a:lumMod val="60000"/>
+              <a:lumOff val="40000"/>
+            </a:schemeClr>
+          </a:solidFill>
+        </p:spPr>
+        <p:style>
+          <a:lnRef idx="2">
+            <a:schemeClr val="accent1">
+              <a:shade val="50000"/>
+            </a:schemeClr>
+          </a:lnRef>
+          <a:fillRef idx="1">
+            <a:schemeClr val="accent1"/>
+          </a:fillRef>
+          <a:effectRef idx="0">
+            <a:schemeClr val="accent1"/>
+          </a:effectRef>
+          <a:fontRef idx="minor">
+            <a:schemeClr val="lt1"/>
+          </a:fontRef>
+        </p:style>
+        <p:txBody>
+          <a:bodyPr rtlCol="0" anchor="ctr"/>
+          <a:lstStyle/>
+          <a:p>
+            <a:pPr algn="ctr"/>
+            <a:endParaRPr lang="en-US"/>
+          </a:p>
+        </p:txBody>
+      </p:sp>
+      <p:sp>
+        <p:nvSpPr>
+          <p:cNvPr id="21" name="Rectangle 20">
+            <a:extLst>
+              <a:ext uri="{FF2B5EF4-FFF2-40B4-BE49-F238E27FC236}">
+                <a16:creationId xmlns:a16="http://schemas.microsoft.com/office/drawing/2014/main" id="{05544F77-5B7E-3145-9CA4-08584808B1FD}"/>
+              </a:ext>
+            </a:extLst>
+          </p:cNvPr>
+          <p:cNvSpPr/>
+          <p:nvPr/>
+        </p:nvSpPr>
+        <p:spPr>
+          <a:xfrm>
+            <a:off x="8522370" y="3695172"/>
+            <a:ext cx="687045" cy="261258"/>
+          </a:xfrm>
+          <a:prstGeom prst="rect">
+            <a:avLst/>
+          </a:prstGeom>
+          <a:solidFill>
+            <a:schemeClr val="accent4">
+              <a:lumMod val="60000"/>
+              <a:lumOff val="40000"/>
+            </a:schemeClr>
+          </a:solidFill>
+        </p:spPr>
+        <p:style>
+          <a:lnRef idx="2">
+            <a:schemeClr val="accent1">
+              <a:shade val="50000"/>
+            </a:schemeClr>
+          </a:lnRef>
+          <a:fillRef idx="1">
+            <a:schemeClr val="accent1"/>
+          </a:fillRef>
+          <a:effectRef idx="0">
+            <a:schemeClr val="accent1"/>
+          </a:effectRef>
+          <a:fontRef idx="minor">
+            <a:schemeClr val="lt1"/>
+          </a:fontRef>
+        </p:style>
+        <p:txBody>
+          <a:bodyPr rtlCol="0" anchor="ctr"/>
+          <a:lstStyle/>
+          <a:p>
+            <a:pPr algn="ctr"/>
+            <a:endParaRPr lang="en-US"/>
+          </a:p>
+        </p:txBody>
+      </p:sp>
+      <p:sp>
+        <p:nvSpPr>
+          <p:cNvPr id="22" name="Rectangle 21">
+            <a:extLst>
+              <a:ext uri="{FF2B5EF4-FFF2-40B4-BE49-F238E27FC236}">
+                <a16:creationId xmlns:a16="http://schemas.microsoft.com/office/drawing/2014/main" id="{17A16B9D-E8A7-1446-9429-829E176C3D58}"/>
+              </a:ext>
+            </a:extLst>
+          </p:cNvPr>
+          <p:cNvSpPr/>
+          <p:nvPr/>
+        </p:nvSpPr>
+        <p:spPr>
+          <a:xfrm>
+            <a:off x="9950658" y="3264696"/>
+            <a:ext cx="687045" cy="261258"/>
+          </a:xfrm>
+          <a:prstGeom prst="rect">
+            <a:avLst/>
+          </a:prstGeom>
+          <a:solidFill>
+            <a:schemeClr val="accent4">
+              <a:lumMod val="60000"/>
+              <a:lumOff val="40000"/>
+            </a:schemeClr>
+          </a:solidFill>
+        </p:spPr>
+        <p:style>
+          <a:lnRef idx="2">
+            <a:schemeClr val="accent1">
+              <a:shade val="50000"/>
+            </a:schemeClr>
+          </a:lnRef>
+          <a:fillRef idx="1">
+            <a:schemeClr val="accent1"/>
+          </a:fillRef>
+          <a:effectRef idx="0">
+            <a:schemeClr val="accent1"/>
+          </a:effectRef>
+          <a:fontRef idx="minor">
+            <a:schemeClr val="lt1"/>
+          </a:fontRef>
+        </p:style>
+        <p:txBody>
+          <a:bodyPr rtlCol="0" anchor="ctr"/>
+          <a:lstStyle/>
+          <a:p>
+            <a:pPr algn="ctr"/>
+            <a:endParaRPr lang="en-US" dirty="0"/>
+          </a:p>
+        </p:txBody>
+      </p:sp>
+      <p:sp>
+        <p:nvSpPr>
+          <p:cNvPr id="23" name="Rectangle 22">
+            <a:extLst>
+              <a:ext uri="{FF2B5EF4-FFF2-40B4-BE49-F238E27FC236}">
+                <a16:creationId xmlns:a16="http://schemas.microsoft.com/office/drawing/2014/main" id="{0C17B339-CB26-7B45-A2F0-075BD7118DFA}"/>
+              </a:ext>
+            </a:extLst>
+          </p:cNvPr>
+          <p:cNvSpPr/>
+          <p:nvPr/>
+        </p:nvSpPr>
+        <p:spPr>
+          <a:xfrm>
+            <a:off x="9950657" y="2758149"/>
+            <a:ext cx="687045" cy="261258"/>
+          </a:xfrm>
+          <a:prstGeom prst="rect">
+            <a:avLst/>
+          </a:prstGeom>
+          <a:solidFill>
+            <a:schemeClr val="accent4">
+              <a:lumMod val="60000"/>
+              <a:lumOff val="40000"/>
+            </a:schemeClr>
+          </a:solidFill>
+        </p:spPr>
+        <p:style>
+          <a:lnRef idx="2">
+            <a:schemeClr val="accent1">
+              <a:shade val="50000"/>
+            </a:schemeClr>
+          </a:lnRef>
+          <a:fillRef idx="1">
+            <a:schemeClr val="accent1"/>
+          </a:fillRef>
+          <a:effectRef idx="0">
+            <a:schemeClr val="accent1"/>
+          </a:effectRef>
+          <a:fontRef idx="minor">
+            <a:schemeClr val="lt1"/>
+          </a:fontRef>
+        </p:style>
+        <p:txBody>
+          <a:bodyPr rtlCol="0" anchor="ctr"/>
+          <a:lstStyle/>
+          <a:p>
+            <a:pPr algn="ctr"/>
+            <a:endParaRPr lang="en-US"/>
+          </a:p>
+        </p:txBody>
+      </p:sp>
+      <p:sp>
+        <p:nvSpPr>
+          <p:cNvPr id="24" name="Rectangle 23">
+            <a:extLst>
+              <a:ext uri="{FF2B5EF4-FFF2-40B4-BE49-F238E27FC236}">
+                <a16:creationId xmlns:a16="http://schemas.microsoft.com/office/drawing/2014/main" id="{9986CE53-0007-AD47-A110-401D4AD40BB8}"/>
+              </a:ext>
+            </a:extLst>
+          </p:cNvPr>
+          <p:cNvSpPr/>
+          <p:nvPr/>
+        </p:nvSpPr>
+        <p:spPr>
+          <a:xfrm>
+            <a:off x="9950658" y="3020893"/>
+            <a:ext cx="687045" cy="261258"/>
+          </a:xfrm>
+          <a:prstGeom prst="rect">
+            <a:avLst/>
+          </a:prstGeom>
+          <a:solidFill>
+            <a:schemeClr val="accent4">
+              <a:lumMod val="60000"/>
+              <a:lumOff val="40000"/>
+            </a:schemeClr>
+          </a:solidFill>
+        </p:spPr>
+        <p:style>
+          <a:lnRef idx="2">
+            <a:schemeClr val="accent1">
+              <a:shade val="50000"/>
+            </a:schemeClr>
+          </a:lnRef>
+          <a:fillRef idx="1">
+            <a:schemeClr val="accent1"/>
+          </a:fillRef>
+          <a:effectRef idx="0">
+            <a:schemeClr val="accent1"/>
+          </a:effectRef>
+          <a:fontRef idx="minor">
+            <a:schemeClr val="lt1"/>
+          </a:fontRef>
+        </p:style>
+        <p:txBody>
+          <a:bodyPr rtlCol="0" anchor="ctr"/>
+          <a:lstStyle/>
+          <a:p>
+            <a:pPr algn="ctr"/>
+            <a:endParaRPr lang="en-US"/>
+          </a:p>
+        </p:txBody>
+      </p:sp>
+      <p:sp>
+        <p:nvSpPr>
+          <p:cNvPr id="25" name="Rectangle 24">
+            <a:extLst>
+              <a:ext uri="{FF2B5EF4-FFF2-40B4-BE49-F238E27FC236}">
+                <a16:creationId xmlns:a16="http://schemas.microsoft.com/office/drawing/2014/main" id="{9B1A9061-E824-7547-9961-7FE04010335F}"/>
+              </a:ext>
+            </a:extLst>
+          </p:cNvPr>
+          <p:cNvSpPr/>
+          <p:nvPr/>
+        </p:nvSpPr>
+        <p:spPr>
+          <a:xfrm>
+            <a:off x="9950658" y="3509618"/>
+            <a:ext cx="687045" cy="261258"/>
+          </a:xfrm>
+          <a:prstGeom prst="rect">
+            <a:avLst/>
+          </a:prstGeom>
+          <a:solidFill>
+            <a:schemeClr val="accent4">
+              <a:lumMod val="60000"/>
+              <a:lumOff val="40000"/>
+            </a:schemeClr>
+          </a:solidFill>
+        </p:spPr>
+        <p:style>
+          <a:lnRef idx="2">
+            <a:schemeClr val="accent1">
+              <a:shade val="50000"/>
+            </a:schemeClr>
+          </a:lnRef>
+          <a:fillRef idx="1">
+            <a:schemeClr val="accent1"/>
+          </a:fillRef>
+          <a:effectRef idx="0">
+            <a:schemeClr val="accent1"/>
+          </a:effectRef>
+          <a:fontRef idx="minor">
+            <a:schemeClr val="lt1"/>
+          </a:fontRef>
+        </p:style>
+        <p:txBody>
+          <a:bodyPr rtlCol="0" anchor="ctr"/>
+          <a:lstStyle/>
+          <a:p>
+            <a:pPr algn="ctr"/>
+            <a:endParaRPr lang="en-US"/>
+          </a:p>
+        </p:txBody>
+      </p:sp>
+      <p:sp>
+        <p:nvSpPr>
+          <p:cNvPr id="26" name="Rectangle 25">
+            <a:extLst>
+              <a:ext uri="{FF2B5EF4-FFF2-40B4-BE49-F238E27FC236}">
+                <a16:creationId xmlns:a16="http://schemas.microsoft.com/office/drawing/2014/main" id="{A3F578BE-C8D3-4142-ACE2-A962B6CDD982}"/>
+              </a:ext>
+            </a:extLst>
+          </p:cNvPr>
+          <p:cNvSpPr/>
+          <p:nvPr/>
+        </p:nvSpPr>
+        <p:spPr>
+          <a:xfrm>
+            <a:off x="10521538" y="4243433"/>
+            <a:ext cx="1384594" cy="310754"/>
+          </a:xfrm>
+          <a:prstGeom prst="rect">
+            <a:avLst/>
+          </a:prstGeom>
+          <a:solidFill>
+            <a:schemeClr val="bg2">
+              <a:lumMod val="20000"/>
+              <a:lumOff val="80000"/>
+            </a:schemeClr>
+          </a:solidFill>
+        </p:spPr>
+        <p:style>
+          <a:lnRef idx="2">
+            <a:schemeClr val="accent1">
+              <a:shade val="50000"/>
+            </a:schemeClr>
+          </a:lnRef>
+          <a:fillRef idx="1">
+            <a:schemeClr val="accent1"/>
+          </a:fillRef>
+          <a:effectRef idx="0">
+            <a:schemeClr val="accent1"/>
+          </a:effectRef>
+          <a:fontRef idx="minor">
+            <a:schemeClr val="lt1"/>
+          </a:fontRef>
+        </p:style>
+        <p:txBody>
+          <a:bodyPr rtlCol="0" anchor="ctr"/>
+          <a:lstStyle/>
+          <a:p>
+            <a:pPr algn="ctr"/>
+            <a:r>
+              <a:rPr lang="en-US" dirty="0">
+                <a:solidFill>
+                  <a:schemeClr val="bg1"/>
+                </a:solidFill>
+              </a:rPr>
+              <a:t>ENV_NULL</a:t>
+            </a:r>
+          </a:p>
+        </p:txBody>
+      </p:sp>
+      <p:cxnSp>
+        <p:nvCxnSpPr>
+          <p:cNvPr id="28" name="Straight Arrow Connector 27">
+            <a:extLst>
+              <a:ext uri="{FF2B5EF4-FFF2-40B4-BE49-F238E27FC236}">
+                <a16:creationId xmlns:a16="http://schemas.microsoft.com/office/drawing/2014/main" id="{736A333B-DFA2-784F-98D8-2212A2DD4683}"/>
+              </a:ext>
+            </a:extLst>
+          </p:cNvPr>
+          <p:cNvCxnSpPr>
+            <a:endCxn id="11" idx="1"/>
+          </p:cNvCxnSpPr>
+          <p:nvPr/>
+        </p:nvCxnSpPr>
+        <p:spPr>
+          <a:xfrm flipV="1">
+            <a:off x="7450561" y="3570485"/>
+            <a:ext cx="730677" cy="122742"/>
+          </a:xfrm>
+          <a:prstGeom prst="straightConnector1">
+            <a:avLst/>
+          </a:prstGeom>
+          <a:ln>
+            <a:tailEnd type="triangle"/>
+          </a:ln>
+        </p:spPr>
+        <p:style>
+          <a:lnRef idx="1">
+            <a:schemeClr val="accent1"/>
+          </a:lnRef>
+          <a:fillRef idx="0">
+            <a:schemeClr val="accent1"/>
+          </a:fillRef>
+          <a:effectRef idx="0">
+            <a:schemeClr val="accent1"/>
+          </a:effectRef>
+          <a:fontRef idx="minor">
+            <a:schemeClr val="tx1"/>
+          </a:fontRef>
+        </p:style>
+      </p:cxnSp>
+      <p:cxnSp>
+        <p:nvCxnSpPr>
+          <p:cNvPr id="30" name="Straight Arrow Connector 29">
+            <a:extLst>
+              <a:ext uri="{FF2B5EF4-FFF2-40B4-BE49-F238E27FC236}">
+                <a16:creationId xmlns:a16="http://schemas.microsoft.com/office/drawing/2014/main" id="{DD93A17B-3C54-CF47-A44C-0C03E40564AB}"/>
+              </a:ext>
+            </a:extLst>
+          </p:cNvPr>
+          <p:cNvCxnSpPr>
+            <a:stCxn id="20" idx="3"/>
+            <a:endCxn id="13" idx="1"/>
+          </p:cNvCxnSpPr>
+          <p:nvPr/>
+        </p:nvCxnSpPr>
+        <p:spPr>
+          <a:xfrm flipV="1">
+            <a:off x="9212667" y="2887654"/>
+            <a:ext cx="399547" cy="674944"/>
+          </a:xfrm>
+          <a:prstGeom prst="straightConnector1">
+            <a:avLst/>
+          </a:prstGeom>
+          <a:ln>
+            <a:tailEnd type="triangle"/>
+          </a:ln>
+        </p:spPr>
+        <p:style>
+          <a:lnRef idx="1">
+            <a:schemeClr val="accent1"/>
+          </a:lnRef>
+          <a:fillRef idx="0">
+            <a:schemeClr val="accent1"/>
+          </a:fillRef>
+          <a:effectRef idx="0">
+            <a:schemeClr val="accent1"/>
+          </a:effectRef>
+          <a:fontRef idx="minor">
+            <a:schemeClr val="tx1"/>
+          </a:fontRef>
+        </p:style>
+      </p:cxnSp>
+      <p:cxnSp>
+        <p:nvCxnSpPr>
+          <p:cNvPr id="32" name="Elbow Connector 31">
+            <a:extLst>
+              <a:ext uri="{FF2B5EF4-FFF2-40B4-BE49-F238E27FC236}">
+                <a16:creationId xmlns:a16="http://schemas.microsoft.com/office/drawing/2014/main" id="{D2FD33EF-B453-9C4C-A75B-8DDD1725B2F3}"/>
+              </a:ext>
+            </a:extLst>
+          </p:cNvPr>
+          <p:cNvCxnSpPr>
+            <a:cxnSpLocks/>
+            <a:stCxn id="23" idx="3"/>
+            <a:endCxn id="26" idx="0"/>
+          </p:cNvCxnSpPr>
+          <p:nvPr/>
+        </p:nvCxnSpPr>
+        <p:spPr>
+          <a:xfrm>
+            <a:off x="10637702" y="2888778"/>
+            <a:ext cx="576133" cy="1354655"/>
+          </a:xfrm>
+          <a:prstGeom prst="bentConnector2">
+            <a:avLst/>
+          </a:prstGeom>
+          <a:ln>
+            <a:tailEnd type="triangle"/>
+          </a:ln>
+        </p:spPr>
+        <p:style>
+          <a:lnRef idx="1">
+            <a:schemeClr val="accent1"/>
+          </a:lnRef>
+          <a:fillRef idx="0">
+            <a:schemeClr val="accent1"/>
+          </a:fillRef>
+          <a:effectRef idx="0">
+            <a:schemeClr val="accent1"/>
+          </a:effectRef>
+          <a:fontRef idx="minor">
+            <a:schemeClr val="tx1"/>
+          </a:fontRef>
+        </p:style>
+      </p:cxnSp>
     </p:spTree>
     <p:extLst>
       <p:ext uri="{BB962C8B-B14F-4D97-AF65-F5344CB8AC3E}">
@@ -11023,6 +12811,13 @@
           <a:p>
             <a:r>
               <a:rPr lang="en-US" b="1" dirty="0" err="1"/>
+              <a:t>Val.java</a:t>
+            </a:r>
+            <a:endParaRPr lang="en-US" b="1" dirty="0"/>
+          </a:p>
+          <a:p>
+            <a:r>
+              <a:rPr lang="en-US" b="1" dirty="0" err="1"/>
               <a:t>Env.java</a:t>
             </a:r>
             <a:endParaRPr lang="en-US" b="1" dirty="0"/>
@@ -11045,13 +12840,6 @@
             <a:r>
               <a:rPr lang="en-US" b="1" dirty="0" err="1"/>
               <a:t>Binding.java</a:t>
-            </a:r>
-            <a:endParaRPr lang="en-US" b="1" dirty="0"/>
-          </a:p>
-          <a:p>
-            <a:r>
-              <a:rPr lang="en-US" b="1" dirty="0" err="1"/>
-              <a:t>Val.java</a:t>
             </a:r>
             <a:endParaRPr lang="en-US" b="1" dirty="0"/>
           </a:p>
@@ -11080,7 +12868,7 @@
           <a:p>
             <a:r>
               <a:rPr lang="en-US"/>
-              <a:t>Fall 2020</a:t>
+              <a:t>Spring 2021</a:t>
             </a:r>
           </a:p>
         </p:txBody>
@@ -11297,7 +13085,7 @@
           <a:p>
             <a:r>
               <a:rPr lang="en-US"/>
-              <a:t>Fall 2020</a:t>
+              <a:t>Spring 2021</a:t>
             </a:r>
           </a:p>
         </p:txBody>

</xml_diff>